<commit_message>
Slides da parte de prioridades.
</commit_message>
<xml_diff>
--- a/TempoReacao/SlideTempoReacao.pptx
+++ b/TempoReacao/SlideTempoReacao.pptx
@@ -5,8 +5,9 @@
     <p:sldMasterId id="2147483648" r:id="rId1"/>
   </p:sldMasterIdLst>
   <p:sldIdLst>
-    <p:sldId id="256" r:id="rId3"/>
-    <p:sldId id="257" r:id="rId4"/>
+    <p:sldId id="256" r:id="rId2"/>
+    <p:sldId id="257" r:id="rId3"/>
+    <p:sldId id="265" r:id="rId4"/>
     <p:sldId id="258" r:id="rId5"/>
     <p:sldId id="263" r:id="rId6"/>
     <p:sldId id="260" r:id="rId7"/>
@@ -113,7 +114,7 @@
 </file>
 
 <file path=ppt/slideLayouts/slideLayout1.xml><?xml version="1.0" encoding="utf-8"?>
-<p:sldLayout xmlns:a="http://schemas.openxmlformats.org/drawingml/2006/main" xmlns:r="http://schemas.openxmlformats.org/officeDocument/2006/relationships" xmlns:p="http://schemas.openxmlformats.org/presentationml/2006/main" type="title" preserve="1" showMasterSp="0">
+<p:sldLayout xmlns:a="http://schemas.openxmlformats.org/drawingml/2006/main" xmlns:r="http://schemas.openxmlformats.org/officeDocument/2006/relationships" xmlns:p="http://schemas.openxmlformats.org/presentationml/2006/main" showMasterSp="0" type="title" preserve="1">
   <p:cSld name="Slide de Título">
     <p:spTree>
       <p:nvGrpSpPr>
@@ -836,6 +837,7 @@
           <a:p>
             <a:fld id="{4C2A8502-4119-48F7-AC24-4299A98704B5}" type="datetimeFigureOut">
               <a:rPr lang="pt-BR" smtClean="0"/>
+              <a:t>19/09/2017</a:t>
             </a:fld>
             <a:endParaRPr lang="pt-BR"/>
           </a:p>
@@ -877,6 +879,7 @@
           <a:p>
             <a:fld id="{2A626DA3-8EE5-4280-9EE4-69795BCADE28}" type="slidenum">
               <a:rPr lang="pt-BR" smtClean="0"/>
+              <a:t>‹nº›</a:t>
             </a:fld>
             <a:endParaRPr lang="pt-BR"/>
           </a:p>
@@ -1080,6 +1083,7 @@
           <a:p>
             <a:fld id="{4C2A8502-4119-48F7-AC24-4299A98704B5}" type="datetimeFigureOut">
               <a:rPr lang="pt-BR" smtClean="0"/>
+              <a:t>19/09/2017</a:t>
             </a:fld>
             <a:endParaRPr lang="pt-BR"/>
           </a:p>
@@ -1121,6 +1125,7 @@
           <a:p>
             <a:fld id="{2A626DA3-8EE5-4280-9EE4-69795BCADE28}" type="slidenum">
               <a:rPr lang="pt-BR" smtClean="0"/>
+              <a:t>‹nº›</a:t>
             </a:fld>
             <a:endParaRPr lang="pt-BR"/>
           </a:p>
@@ -1387,6 +1392,7 @@
           <a:p>
             <a:fld id="{4C2A8502-4119-48F7-AC24-4299A98704B5}" type="datetimeFigureOut">
               <a:rPr lang="pt-BR" smtClean="0"/>
+              <a:t>19/09/2017</a:t>
             </a:fld>
             <a:endParaRPr lang="pt-BR"/>
           </a:p>
@@ -1428,6 +1434,7 @@
           <a:p>
             <a:fld id="{2A626DA3-8EE5-4280-9EE4-69795BCADE28}" type="slidenum">
               <a:rPr lang="pt-BR" smtClean="0"/>
+              <a:t>‹nº›</a:t>
             </a:fld>
             <a:endParaRPr lang="pt-BR"/>
           </a:p>
@@ -1707,6 +1714,7 @@
           <a:p>
             <a:fld id="{4C2A8502-4119-48F7-AC24-4299A98704B5}" type="datetimeFigureOut">
               <a:rPr lang="pt-BR" smtClean="0"/>
+              <a:t>19/09/2017</a:t>
             </a:fld>
             <a:endParaRPr lang="pt-BR"/>
           </a:p>
@@ -1748,6 +1756,7 @@
           <a:p>
             <a:fld id="{2A626DA3-8EE5-4280-9EE4-69795BCADE28}" type="slidenum">
               <a:rPr lang="pt-BR" smtClean="0"/>
+              <a:t>‹nº›</a:t>
             </a:fld>
             <a:endParaRPr lang="pt-BR"/>
           </a:p>
@@ -2014,6 +2023,7 @@
           <a:p>
             <a:fld id="{4C2A8502-4119-48F7-AC24-4299A98704B5}" type="datetimeFigureOut">
               <a:rPr lang="pt-BR" smtClean="0"/>
+              <a:t>19/09/2017</a:t>
             </a:fld>
             <a:endParaRPr lang="pt-BR"/>
           </a:p>
@@ -2055,6 +2065,7 @@
           <a:p>
             <a:fld id="{2A626DA3-8EE5-4280-9EE4-69795BCADE28}" type="slidenum">
               <a:rPr lang="pt-BR" smtClean="0"/>
+              <a:t>‹nº›</a:t>
             </a:fld>
             <a:endParaRPr lang="pt-BR"/>
           </a:p>
@@ -2394,6 +2405,7 @@
           <a:p>
             <a:fld id="{4C2A8502-4119-48F7-AC24-4299A98704B5}" type="datetimeFigureOut">
               <a:rPr lang="pt-BR" smtClean="0"/>
+              <a:t>19/09/2017</a:t>
             </a:fld>
             <a:endParaRPr lang="pt-BR"/>
           </a:p>
@@ -2435,6 +2447,7 @@
           <a:p>
             <a:fld id="{2A626DA3-8EE5-4280-9EE4-69795BCADE28}" type="slidenum">
               <a:rPr lang="pt-BR" smtClean="0"/>
+              <a:t>‹nº›</a:t>
             </a:fld>
             <a:endParaRPr lang="pt-BR"/>
           </a:p>
@@ -2508,7 +2521,6 @@
               <a:rPr lang="pt-BR"/>
               <a:t>Editar estilos de texto Mestre</a:t>
             </a:r>
-            <a:endParaRPr lang="pt-BR"/>
           </a:p>
           <a:p>
             <a:pPr lvl="1"/>
@@ -2516,7 +2528,6 @@
               <a:rPr lang="pt-BR"/>
               <a:t>Segundo nível</a:t>
             </a:r>
-            <a:endParaRPr lang="pt-BR"/>
           </a:p>
           <a:p>
             <a:pPr lvl="2"/>
@@ -2524,7 +2535,6 @@
               <a:rPr lang="pt-BR"/>
               <a:t>Terceiro nível</a:t>
             </a:r>
-            <a:endParaRPr lang="pt-BR"/>
           </a:p>
           <a:p>
             <a:pPr lvl="3"/>
@@ -2532,7 +2542,6 @@
               <a:rPr lang="pt-BR"/>
               <a:t>Quarto nível</a:t>
             </a:r>
-            <a:endParaRPr lang="pt-BR"/>
           </a:p>
           <a:p>
             <a:pPr lvl="4"/>
@@ -2561,6 +2570,7 @@
           <a:p>
             <a:fld id="{4C2A8502-4119-48F7-AC24-4299A98704B5}" type="datetimeFigureOut">
               <a:rPr lang="pt-BR" smtClean="0"/>
+              <a:t>19/09/2017</a:t>
             </a:fld>
             <a:endParaRPr lang="pt-BR"/>
           </a:p>
@@ -2602,6 +2612,7 @@
           <a:p>
             <a:fld id="{2A626DA3-8EE5-4280-9EE4-69795BCADE28}" type="slidenum">
               <a:rPr lang="pt-BR" smtClean="0"/>
+              <a:t>‹nº›</a:t>
             </a:fld>
             <a:endParaRPr lang="pt-BR"/>
           </a:p>
@@ -2685,7 +2696,6 @@
               <a:rPr lang="pt-BR"/>
               <a:t>Editar estilos de texto Mestre</a:t>
             </a:r>
-            <a:endParaRPr lang="pt-BR"/>
           </a:p>
           <a:p>
             <a:pPr lvl="1"/>
@@ -2693,7 +2703,6 @@
               <a:rPr lang="pt-BR"/>
               <a:t>Segundo nível</a:t>
             </a:r>
-            <a:endParaRPr lang="pt-BR"/>
           </a:p>
           <a:p>
             <a:pPr lvl="2"/>
@@ -2701,7 +2710,6 @@
               <a:rPr lang="pt-BR"/>
               <a:t>Terceiro nível</a:t>
             </a:r>
-            <a:endParaRPr lang="pt-BR"/>
           </a:p>
           <a:p>
             <a:pPr lvl="3"/>
@@ -2709,7 +2717,6 @@
               <a:rPr lang="pt-BR"/>
               <a:t>Quarto nível</a:t>
             </a:r>
-            <a:endParaRPr lang="pt-BR"/>
           </a:p>
           <a:p>
             <a:pPr lvl="4"/>
@@ -2738,6 +2745,7 @@
           <a:p>
             <a:fld id="{4C2A8502-4119-48F7-AC24-4299A98704B5}" type="datetimeFigureOut">
               <a:rPr lang="pt-BR" smtClean="0"/>
+              <a:t>19/09/2017</a:t>
             </a:fld>
             <a:endParaRPr lang="pt-BR"/>
           </a:p>
@@ -2779,6 +2787,7 @@
           <a:p>
             <a:fld id="{2A626DA3-8EE5-4280-9EE4-69795BCADE28}" type="slidenum">
               <a:rPr lang="pt-BR" smtClean="0"/>
+              <a:t>‹nº›</a:t>
             </a:fld>
             <a:endParaRPr lang="pt-BR"/>
           </a:p>
@@ -2858,7 +2867,6 @@
               <a:rPr lang="pt-BR"/>
               <a:t>Editar estilos de texto Mestre</a:t>
             </a:r>
-            <a:endParaRPr lang="pt-BR"/>
           </a:p>
           <a:p>
             <a:pPr lvl="1"/>
@@ -2866,7 +2874,6 @@
               <a:rPr lang="pt-BR"/>
               <a:t>Segundo nível</a:t>
             </a:r>
-            <a:endParaRPr lang="pt-BR"/>
           </a:p>
           <a:p>
             <a:pPr lvl="2"/>
@@ -2874,7 +2881,6 @@
               <a:rPr lang="pt-BR"/>
               <a:t>Terceiro nível</a:t>
             </a:r>
-            <a:endParaRPr lang="pt-BR"/>
           </a:p>
           <a:p>
             <a:pPr lvl="3"/>
@@ -2882,7 +2888,6 @@
               <a:rPr lang="pt-BR"/>
               <a:t>Quarto nível</a:t>
             </a:r>
-            <a:endParaRPr lang="pt-BR"/>
           </a:p>
           <a:p>
             <a:pPr lvl="4"/>
@@ -2911,6 +2916,7 @@
           <a:p>
             <a:fld id="{4C2A8502-4119-48F7-AC24-4299A98704B5}" type="datetimeFigureOut">
               <a:rPr lang="pt-BR" smtClean="0"/>
+              <a:t>19/09/2017</a:t>
             </a:fld>
             <a:endParaRPr lang="pt-BR"/>
           </a:p>
@@ -2952,6 +2958,7 @@
           <a:p>
             <a:fld id="{2A626DA3-8EE5-4280-9EE4-69795BCADE28}" type="slidenum">
               <a:rPr lang="pt-BR" smtClean="0"/>
+              <a:t>‹nº›</a:t>
             </a:fld>
             <a:endParaRPr lang="pt-BR"/>
           </a:p>
@@ -3151,6 +3158,7 @@
           <a:p>
             <a:fld id="{4C2A8502-4119-48F7-AC24-4299A98704B5}" type="datetimeFigureOut">
               <a:rPr lang="pt-BR" smtClean="0"/>
+              <a:t>19/09/2017</a:t>
             </a:fld>
             <a:endParaRPr lang="pt-BR"/>
           </a:p>
@@ -3192,6 +3200,7 @@
           <a:p>
             <a:fld id="{2A626DA3-8EE5-4280-9EE4-69795BCADE28}" type="slidenum">
               <a:rPr lang="pt-BR" smtClean="0"/>
+              <a:t>‹nº›</a:t>
             </a:fld>
             <a:endParaRPr lang="pt-BR"/>
           </a:p>
@@ -3270,7 +3279,6 @@
               <a:rPr lang="pt-BR"/>
               <a:t>Editar estilos de texto Mestre</a:t>
             </a:r>
-            <a:endParaRPr lang="pt-BR"/>
           </a:p>
           <a:p>
             <a:pPr lvl="1"/>
@@ -3278,7 +3286,6 @@
               <a:rPr lang="pt-BR"/>
               <a:t>Segundo nível</a:t>
             </a:r>
-            <a:endParaRPr lang="pt-BR"/>
           </a:p>
           <a:p>
             <a:pPr lvl="2"/>
@@ -3286,7 +3293,6 @@
               <a:rPr lang="pt-BR"/>
               <a:t>Terceiro nível</a:t>
             </a:r>
-            <a:endParaRPr lang="pt-BR"/>
           </a:p>
           <a:p>
             <a:pPr lvl="3"/>
@@ -3294,7 +3300,6 @@
               <a:rPr lang="pt-BR"/>
               <a:t>Quarto nível</a:t>
             </a:r>
-            <a:endParaRPr lang="pt-BR"/>
           </a:p>
           <a:p>
             <a:pPr lvl="4"/>
@@ -3331,7 +3336,6 @@
               <a:rPr lang="pt-BR"/>
               <a:t>Editar estilos de texto Mestre</a:t>
             </a:r>
-            <a:endParaRPr lang="pt-BR"/>
           </a:p>
           <a:p>
             <a:pPr lvl="1"/>
@@ -3339,7 +3343,6 @@
               <a:rPr lang="pt-BR"/>
               <a:t>Segundo nível</a:t>
             </a:r>
-            <a:endParaRPr lang="pt-BR"/>
           </a:p>
           <a:p>
             <a:pPr lvl="2"/>
@@ -3347,7 +3350,6 @@
               <a:rPr lang="pt-BR"/>
               <a:t>Terceiro nível</a:t>
             </a:r>
-            <a:endParaRPr lang="pt-BR"/>
           </a:p>
           <a:p>
             <a:pPr lvl="3"/>
@@ -3355,7 +3357,6 @@
               <a:rPr lang="pt-BR"/>
               <a:t>Quarto nível</a:t>
             </a:r>
-            <a:endParaRPr lang="pt-BR"/>
           </a:p>
           <a:p>
             <a:pPr lvl="4"/>
@@ -3384,6 +3385,7 @@
           <a:p>
             <a:fld id="{4C2A8502-4119-48F7-AC24-4299A98704B5}" type="datetimeFigureOut">
               <a:rPr lang="pt-BR" smtClean="0"/>
+              <a:t>19/09/2017</a:t>
             </a:fld>
             <a:endParaRPr lang="pt-BR"/>
           </a:p>
@@ -3425,6 +3427,7 @@
           <a:p>
             <a:fld id="{2A626DA3-8EE5-4280-9EE4-69795BCADE28}" type="slidenum">
               <a:rPr lang="pt-BR" smtClean="0"/>
+              <a:t>‹nº›</a:t>
             </a:fld>
             <a:endParaRPr lang="pt-BR"/>
           </a:p>
@@ -3576,7 +3579,6 @@
               <a:rPr lang="pt-BR"/>
               <a:t>Editar estilos de texto Mestre</a:t>
             </a:r>
-            <a:endParaRPr lang="pt-BR"/>
           </a:p>
           <a:p>
             <a:pPr lvl="1"/>
@@ -3584,7 +3586,6 @@
               <a:rPr lang="pt-BR"/>
               <a:t>Segundo nível</a:t>
             </a:r>
-            <a:endParaRPr lang="pt-BR"/>
           </a:p>
           <a:p>
             <a:pPr lvl="2"/>
@@ -3592,7 +3593,6 @@
               <a:rPr lang="pt-BR"/>
               <a:t>Terceiro nível</a:t>
             </a:r>
-            <a:endParaRPr lang="pt-BR"/>
           </a:p>
           <a:p>
             <a:pPr lvl="3"/>
@@ -3600,7 +3600,6 @@
               <a:rPr lang="pt-BR"/>
               <a:t>Quarto nível</a:t>
             </a:r>
-            <a:endParaRPr lang="pt-BR"/>
           </a:p>
           <a:p>
             <a:pPr lvl="4"/>
@@ -3706,7 +3705,6 @@
               <a:rPr lang="pt-BR"/>
               <a:t>Editar estilos de texto Mestre</a:t>
             </a:r>
-            <a:endParaRPr lang="pt-BR"/>
           </a:p>
           <a:p>
             <a:pPr lvl="1"/>
@@ -3714,7 +3712,6 @@
               <a:rPr lang="pt-BR"/>
               <a:t>Segundo nível</a:t>
             </a:r>
-            <a:endParaRPr lang="pt-BR"/>
           </a:p>
           <a:p>
             <a:pPr lvl="2"/>
@@ -3722,7 +3719,6 @@
               <a:rPr lang="pt-BR"/>
               <a:t>Terceiro nível</a:t>
             </a:r>
-            <a:endParaRPr lang="pt-BR"/>
           </a:p>
           <a:p>
             <a:pPr lvl="3"/>
@@ -3730,7 +3726,6 @@
               <a:rPr lang="pt-BR"/>
               <a:t>Quarto nível</a:t>
             </a:r>
-            <a:endParaRPr lang="pt-BR"/>
           </a:p>
           <a:p>
             <a:pPr lvl="4"/>
@@ -3759,6 +3754,7 @@
           <a:p>
             <a:fld id="{4C2A8502-4119-48F7-AC24-4299A98704B5}" type="datetimeFigureOut">
               <a:rPr lang="pt-BR" smtClean="0"/>
+              <a:t>19/09/2017</a:t>
             </a:fld>
             <a:endParaRPr lang="pt-BR"/>
           </a:p>
@@ -3800,6 +3796,7 @@
           <a:p>
             <a:fld id="{2A626DA3-8EE5-4280-9EE4-69795BCADE28}" type="slidenum">
               <a:rPr lang="pt-BR" smtClean="0"/>
+              <a:t>‹nº›</a:t>
             </a:fld>
             <a:endParaRPr lang="pt-BR"/>
           </a:p>
@@ -3875,6 +3872,7 @@
           <a:p>
             <a:fld id="{4C2A8502-4119-48F7-AC24-4299A98704B5}" type="datetimeFigureOut">
               <a:rPr lang="pt-BR" smtClean="0"/>
+              <a:t>19/09/2017</a:t>
             </a:fld>
             <a:endParaRPr lang="pt-BR"/>
           </a:p>
@@ -3916,6 +3914,7 @@
           <a:p>
             <a:fld id="{2A626DA3-8EE5-4280-9EE4-69795BCADE28}" type="slidenum">
               <a:rPr lang="pt-BR" smtClean="0"/>
+              <a:t>‹nº›</a:t>
             </a:fld>
             <a:endParaRPr lang="pt-BR"/>
           </a:p>
@@ -3963,6 +3962,7 @@
           <a:p>
             <a:fld id="{4C2A8502-4119-48F7-AC24-4299A98704B5}" type="datetimeFigureOut">
               <a:rPr lang="pt-BR" smtClean="0"/>
+              <a:t>19/09/2017</a:t>
             </a:fld>
             <a:endParaRPr lang="pt-BR"/>
           </a:p>
@@ -4004,6 +4004,7 @@
           <a:p>
             <a:fld id="{2A626DA3-8EE5-4280-9EE4-69795BCADE28}" type="slidenum">
               <a:rPr lang="pt-BR" smtClean="0"/>
+              <a:t>‹nº›</a:t>
             </a:fld>
             <a:endParaRPr lang="pt-BR"/>
           </a:p>
@@ -4095,7 +4096,6 @@
               <a:rPr lang="pt-BR"/>
               <a:t>Editar estilos de texto Mestre</a:t>
             </a:r>
-            <a:endParaRPr lang="pt-BR"/>
           </a:p>
           <a:p>
             <a:pPr lvl="1"/>
@@ -4103,7 +4103,6 @@
               <a:rPr lang="pt-BR"/>
               <a:t>Segundo nível</a:t>
             </a:r>
-            <a:endParaRPr lang="pt-BR"/>
           </a:p>
           <a:p>
             <a:pPr lvl="2"/>
@@ -4111,7 +4110,6 @@
               <a:rPr lang="pt-BR"/>
               <a:t>Terceiro nível</a:t>
             </a:r>
-            <a:endParaRPr lang="pt-BR"/>
           </a:p>
           <a:p>
             <a:pPr lvl="3"/>
@@ -4119,7 +4117,6 @@
               <a:rPr lang="pt-BR"/>
               <a:t>Quarto nível</a:t>
             </a:r>
-            <a:endParaRPr lang="pt-BR"/>
           </a:p>
           <a:p>
             <a:pPr lvl="4"/>
@@ -4215,6 +4212,7 @@
           <a:p>
             <a:fld id="{4C2A8502-4119-48F7-AC24-4299A98704B5}" type="datetimeFigureOut">
               <a:rPr lang="pt-BR" smtClean="0"/>
+              <a:t>19/09/2017</a:t>
             </a:fld>
             <a:endParaRPr lang="pt-BR"/>
           </a:p>
@@ -4256,6 +4254,7 @@
           <a:p>
             <a:fld id="{2A626DA3-8EE5-4280-9EE4-69795BCADE28}" type="slidenum">
               <a:rPr lang="pt-BR" smtClean="0"/>
+              <a:t>‹nº›</a:t>
             </a:fld>
             <a:endParaRPr lang="pt-BR"/>
           </a:p>
@@ -4471,6 +4470,7 @@
           <a:p>
             <a:fld id="{4C2A8502-4119-48F7-AC24-4299A98704B5}" type="datetimeFigureOut">
               <a:rPr lang="pt-BR" smtClean="0"/>
+              <a:t>19/09/2017</a:t>
             </a:fld>
             <a:endParaRPr lang="pt-BR"/>
           </a:p>
@@ -4512,6 +4512,7 @@
           <a:p>
             <a:fld id="{2A626DA3-8EE5-4280-9EE4-69795BCADE28}" type="slidenum">
               <a:rPr lang="pt-BR" smtClean="0"/>
+              <a:t>‹nº›</a:t>
             </a:fld>
             <a:endParaRPr lang="pt-BR"/>
           </a:p>
@@ -5142,7 +5143,6 @@
               <a:rPr lang="pt-BR"/>
               <a:t>Editar estilos de texto Mestre</a:t>
             </a:r>
-            <a:endParaRPr lang="pt-BR"/>
           </a:p>
           <a:p>
             <a:pPr lvl="1"/>
@@ -5150,7 +5150,6 @@
               <a:rPr lang="pt-BR"/>
               <a:t>Segundo nível</a:t>
             </a:r>
-            <a:endParaRPr lang="pt-BR"/>
           </a:p>
           <a:p>
             <a:pPr lvl="2"/>
@@ -5158,7 +5157,6 @@
               <a:rPr lang="pt-BR"/>
               <a:t>Terceiro nível</a:t>
             </a:r>
-            <a:endParaRPr lang="pt-BR"/>
           </a:p>
           <a:p>
             <a:pPr lvl="3"/>
@@ -5166,7 +5164,6 @@
               <a:rPr lang="pt-BR"/>
               <a:t>Quarto nível</a:t>
             </a:r>
-            <a:endParaRPr lang="pt-BR"/>
           </a:p>
           <a:p>
             <a:pPr lvl="4"/>
@@ -5213,6 +5210,7 @@
           <a:p>
             <a:fld id="{4C2A8502-4119-48F7-AC24-4299A98704B5}" type="datetimeFigureOut">
               <a:rPr lang="pt-BR" smtClean="0"/>
+              <a:t>19/09/2017</a:t>
             </a:fld>
             <a:endParaRPr lang="pt-BR"/>
           </a:p>
@@ -5288,6 +5286,7 @@
           <a:p>
             <a:fld id="{2A626DA3-8EE5-4280-9EE4-69795BCADE28}" type="slidenum">
               <a:rPr lang="pt-BR" smtClean="0"/>
+              <a:t>‹nº›</a:t>
             </a:fld>
             <a:endParaRPr lang="pt-BR"/>
           </a:p>
@@ -5913,9 +5912,6 @@
               </a:rPr>
               <a:t>BEAGLE BOARD</a:t>
             </a:r>
-            <a:endParaRPr lang="x-none" altLang="pt-BR" sz="4000" dirty="0">
-              <a:latin typeface="+mn-lt"/>
-            </a:endParaRPr>
           </a:p>
         </p:txBody>
       </p:sp>
@@ -5999,33 +5995,95 @@
               <a:rPr lang="pt-BR" sz="2400" dirty="0"/>
               <a:t>;</a:t>
             </a:r>
-            <a:endParaRPr lang="pt-BR" sz="2400" dirty="0"/>
           </a:p>
           <a:p>
             <a:pPr algn="just"/>
             <a:r>
               <a:rPr lang="x-none" altLang="pt-BR" sz="2400" dirty="0"/>
-              <a:t>Acende um LED e aguarda o aperto de um botão e posteriormente é mensurado o tempo entre o acender do LED ao aperto do botão</a:t>
+              <a:t>Acende </a:t>
+            </a:r>
+            <a:r>
+              <a:rPr lang="x-none" altLang="pt-BR" sz="2400"/>
+              <a:t>um </a:t>
+            </a:r>
+            <a:r>
+              <a:rPr lang="x-none" altLang="pt-BR" sz="2400" smtClean="0"/>
+              <a:t>LED</a:t>
+            </a:r>
+            <a:r>
+              <a:rPr lang="pt-BR" altLang="pt-BR" sz="2400" dirty="0" smtClean="0"/>
+              <a:t>,</a:t>
+            </a:r>
+            <a:r>
+              <a:rPr lang="x-none" altLang="pt-BR" sz="2400" smtClean="0"/>
+              <a:t> </a:t>
+            </a:r>
+            <a:r>
+              <a:rPr lang="x-none" altLang="pt-BR" sz="2400" dirty="0"/>
+              <a:t>aguarda o aperto de um botão e posteriormente é mensurado o tempo entre o acender do LED ao aperto do botão</a:t>
             </a:r>
             <a:r>
               <a:rPr lang="pt-BR" sz="2400" dirty="0"/>
               <a:t>;</a:t>
             </a:r>
+          </a:p>
+          <a:p>
+            <a:pPr algn="just"/>
+            <a:r>
+              <a:rPr lang="x-none" altLang="pt-BR" sz="2400" dirty="0"/>
+              <a:t>Feito </a:t>
+            </a:r>
+            <a:r>
+              <a:rPr lang="x-none" altLang="pt-BR" sz="2400"/>
+              <a:t>na </a:t>
+            </a:r>
+            <a:r>
+              <a:rPr lang="pt-BR" altLang="pt-BR" sz="2400" dirty="0" smtClean="0"/>
+              <a:t>plataforma </a:t>
+            </a:r>
+            <a:r>
+              <a:rPr lang="x-none" altLang="pt-BR" sz="2400" smtClean="0"/>
+              <a:t>Beagle </a:t>
+            </a:r>
+            <a:r>
+              <a:rPr lang="x-none" altLang="pt-BR" sz="2400"/>
+              <a:t>Board </a:t>
+            </a:r>
+            <a:r>
+              <a:rPr lang="x-none" altLang="pt-BR" sz="2400" smtClean="0"/>
+              <a:t>Black;</a:t>
+            </a:r>
             <a:endParaRPr lang="pt-BR" sz="2400" dirty="0"/>
           </a:p>
           <a:p>
             <a:pPr algn="just"/>
             <a:r>
+              <a:rPr lang="pt-BR" altLang="pt-BR" sz="2400" dirty="0" smtClean="0"/>
+              <a:t>Foi utilizado um</a:t>
+            </a:r>
+            <a:r>
+              <a:rPr lang="x-none" altLang="pt-BR" sz="2400" smtClean="0"/>
+              <a:t> </a:t>
+            </a:r>
+            <a:r>
               <a:rPr lang="x-none" altLang="pt-BR" sz="2400" dirty="0"/>
-              <a:t>Feito na Beagle Board Black;</a:t>
-            </a:r>
-            <a:endParaRPr lang="pt-BR" sz="2400" dirty="0"/>
-          </a:p>
-          <a:p>
-            <a:pPr algn="just"/>
-            <a:r>
-              <a:rPr lang="x-none" altLang="pt-BR" sz="2400" dirty="0"/>
-              <a:t>Utilizamos display de 7 segmentos com 4 digitos para demonstrar o tempo.</a:t>
+              <a:t>display de 7 segmentos com 4 digitos para demonstrar </a:t>
+            </a:r>
+            <a:r>
+              <a:rPr lang="x-none" altLang="pt-BR" sz="2400"/>
+              <a:t>o </a:t>
+            </a:r>
+            <a:r>
+              <a:rPr lang="x-none" altLang="pt-BR" sz="2400" smtClean="0"/>
+              <a:t>tempo</a:t>
+            </a:r>
+            <a:r>
+              <a:rPr lang="pt-BR" altLang="pt-BR" sz="2400" dirty="0" smtClean="0"/>
+              <a:t>, com precisão de 3 casas decimais</a:t>
+            </a:r>
+            <a:r>
+              <a:rPr lang="x-none" altLang="pt-BR" sz="2400" smtClean="0"/>
+              <a:t>.</a:t>
             </a:r>
             <a:endParaRPr lang="x-none" altLang="pt-BR" sz="2400" dirty="0"/>
           </a:p>
@@ -6075,48 +6133,91 @@
           <a:lstStyle/>
           <a:p>
             <a:r>
-              <a:rPr lang="pt-BR" dirty="0">
-                <a:latin typeface="+mn-lt"/>
-              </a:rPr>
-              <a:t>ESTRUTURA DO </a:t>
-            </a:r>
-            <a:r>
-              <a:rPr lang="x-none" altLang="pt-BR" dirty="0">
-                <a:latin typeface="+mn-lt"/>
-              </a:rPr>
-              <a:t>CÓDIGO</a:t>
-            </a:r>
-            <a:endParaRPr lang="x-none" altLang="pt-BR" dirty="0">
-              <a:latin typeface="+mn-lt"/>
-            </a:endParaRPr>
-          </a:p>
-        </p:txBody>
-      </p:sp>
-      <p:pic>
-        <p:nvPicPr>
-          <p:cNvPr id="3" name="Picture 2"/>
-          <p:cNvPicPr>
-            <a:picLocks noChangeAspect="1"/>
-          </p:cNvPicPr>
-          <p:nvPr/>
-        </p:nvPicPr>
-        <p:blipFill>
-          <a:blip r:embed="rId1"/>
-          <a:stretch>
-            <a:fillRect/>
-          </a:stretch>
-        </p:blipFill>
+              <a:rPr lang="pt-BR" dirty="0" smtClean="0"/>
+              <a:t>ESTRUTURA DO CÓDIGO</a:t>
+            </a:r>
+            <a:endParaRPr lang="pt-BR" dirty="0"/>
+          </a:p>
+        </p:txBody>
+      </p:sp>
+      <p:sp>
+        <p:nvSpPr>
+          <p:cNvPr id="3" name="Espaço Reservado para Conteúdo 2"/>
+          <p:cNvSpPr>
+            <a:spLocks noGrp="1"/>
+          </p:cNvSpPr>
+          <p:nvPr>
+            <p:ph idx="1"/>
+          </p:nvPr>
+        </p:nvSpPr>
         <p:spPr>
           <a:xfrm>
-            <a:off x="1079500" y="1867535"/>
-            <a:ext cx="6923405" cy="3977640"/>
+            <a:off x="677333" y="2160589"/>
+            <a:ext cx="10588429" cy="3880773"/>
           </a:xfrm>
-          <a:prstGeom prst="rect">
-            <a:avLst/>
-          </a:prstGeom>
         </p:spPr>
-      </p:pic>
+        <p:txBody>
+          <a:bodyPr/>
+          <a:lstStyle/>
+          <a:p>
+            <a:pPr algn="just"/>
+            <a:r>
+              <a:rPr lang="pt-BR" sz="2400" dirty="0" smtClean="0"/>
+              <a:t>Código fonte do código implementado com o apoio da biblioteca </a:t>
+            </a:r>
+            <a:r>
+              <a:rPr lang="pt-BR" sz="2400" dirty="0" err="1" smtClean="0"/>
+              <a:t>BlackLib</a:t>
+            </a:r>
+            <a:r>
+              <a:rPr lang="pt-BR" sz="2400" dirty="0" smtClean="0"/>
+              <a:t> em C++;</a:t>
+            </a:r>
+          </a:p>
+          <a:p>
+            <a:pPr algn="just"/>
+            <a:r>
+              <a:rPr lang="pt-BR" sz="2400" dirty="0" smtClean="0"/>
+              <a:t>Todas as entradas (botão) e saídas (</a:t>
+            </a:r>
+            <a:r>
+              <a:rPr lang="pt-BR" sz="2400" dirty="0" err="1" smtClean="0"/>
+              <a:t>led</a:t>
+            </a:r>
+            <a:r>
+              <a:rPr lang="pt-BR" sz="2400" dirty="0" smtClean="0"/>
+              <a:t> e display) foram configuradas como digitais;</a:t>
+            </a:r>
+            <a:endParaRPr lang="pt-BR" sz="2400" dirty="0" smtClean="0"/>
+          </a:p>
+          <a:p>
+            <a:pPr algn="just"/>
+            <a:r>
+              <a:rPr lang="pt-BR" sz="2400" dirty="0" smtClean="0"/>
+              <a:t>Desenvolvimento de uma biblioteca, com utilização de </a:t>
+            </a:r>
+            <a:r>
+              <a:rPr lang="pt-BR" sz="2400" i="1" dirty="0" smtClean="0"/>
+              <a:t>thread</a:t>
+            </a:r>
+            <a:r>
+              <a:rPr lang="pt-BR" sz="2400" dirty="0" smtClean="0"/>
+              <a:t>, para ajudar na exibição dos 4 dígitos no display.</a:t>
+            </a:r>
+            <a:r>
+              <a:rPr lang="pt-BR" sz="2400" dirty="0" smtClean="0"/>
+              <a:t> </a:t>
+            </a:r>
+            <a:endParaRPr lang="pt-BR" dirty="0"/>
+          </a:p>
+        </p:txBody>
+      </p:sp>
     </p:spTree>
+    <p:extLst>
+      <p:ext uri="{BB962C8B-B14F-4D97-AF65-F5344CB8AC3E}">
+        <p14:creationId xmlns:p14="http://schemas.microsoft.com/office/powerpoint/2010/main" val="716469701"/>
+      </p:ext>
+    </p:extLst>
   </p:cSld>
   <p:clrMapOvr>
     <a:masterClrMapping/>
@@ -6151,22 +6252,21 @@
             <p:ph type="title"/>
           </p:nvPr>
         </p:nvSpPr>
-        <p:spPr/>
+        <p:spPr>
+          <a:xfrm>
+            <a:off x="677334" y="609600"/>
+            <a:ext cx="8596668" cy="922986"/>
+          </a:xfrm>
+        </p:spPr>
         <p:txBody>
           <a:bodyPr/>
           <a:lstStyle/>
           <a:p>
             <a:r>
-              <a:rPr lang="pt-BR" dirty="0">
+              <a:rPr lang="pt-BR" dirty="0" smtClean="0">
                 <a:latin typeface="+mn-lt"/>
               </a:rPr>
-              <a:t>ESTRUTURA DO </a:t>
-            </a:r>
-            <a:r>
-              <a:rPr lang="x-none" altLang="pt-BR" dirty="0">
-                <a:latin typeface="+mn-lt"/>
-              </a:rPr>
-              <a:t>CÓDIGO</a:t>
+              <a:t>ESQUEMÁTICO</a:t>
             </a:r>
             <a:endParaRPr lang="x-none" altLang="pt-BR" dirty="0">
               <a:latin typeface="+mn-lt"/>
@@ -6176,26 +6276,66 @@
       </p:sp>
       <p:pic>
         <p:nvPicPr>
-          <p:cNvPr id="4" name="Picture 3"/>
+          <p:cNvPr id="1026" name="Picture 2"/>
           <p:cNvPicPr>
-            <a:picLocks noChangeAspect="1"/>
+            <a:picLocks noChangeAspect="1" noChangeArrowheads="1"/>
           </p:cNvPicPr>
           <p:nvPr/>
         </p:nvPicPr>
         <p:blipFill>
-          <a:blip r:embed="rId1"/>
+          <a:blip r:embed="rId2">
+            <a:extLst>
+              <a:ext uri="{28A0092B-C50C-407E-A947-70E740481C1C}">
+                <a14:useLocalDpi xmlns:a14="http://schemas.microsoft.com/office/drawing/2010/main" val="0"/>
+              </a:ext>
+            </a:extLst>
+          </a:blip>
+          <a:srcRect/>
           <a:stretch>
             <a:fillRect/>
           </a:stretch>
         </p:blipFill>
-        <p:spPr>
+        <p:spPr bwMode="auto">
           <a:xfrm>
-            <a:off x="1647190" y="1379855"/>
-            <a:ext cx="5610225" cy="5271135"/>
+            <a:off x="1429554" y="1397413"/>
+            <a:ext cx="9066727" cy="5100477"/>
           </a:xfrm>
           <a:prstGeom prst="rect">
             <a:avLst/>
           </a:prstGeom>
+          <a:noFill/>
+          <a:ln>
+            <a:noFill/>
+          </a:ln>
+          <a:effectLst/>
+          <a:extLst>
+            <a:ext uri="{909E8E84-426E-40DD-AFC4-6F175D3DCCD1}">
+              <a14:hiddenFill xmlns:a14="http://schemas.microsoft.com/office/drawing/2010/main">
+                <a:solidFill>
+                  <a:schemeClr val="accent1"/>
+                </a:solidFill>
+              </a14:hiddenFill>
+            </a:ext>
+            <a:ext uri="{91240B29-F687-4F45-9708-019B960494DF}">
+              <a14:hiddenLine xmlns:a14="http://schemas.microsoft.com/office/drawing/2010/main" w="9525">
+                <a:solidFill>
+                  <a:schemeClr val="tx1"/>
+                </a:solidFill>
+                <a:miter lim="800000"/>
+                <a:headEnd/>
+                <a:tailEnd/>
+              </a14:hiddenLine>
+            </a:ext>
+            <a:ext uri="{AF507438-7753-43E0-B8FC-AC1667EBCBE1}">
+              <a14:hiddenEffects xmlns:a14="http://schemas.microsoft.com/office/drawing/2010/main">
+                <a:effectLst>
+                  <a:outerShdw dist="35921" dir="2700000" algn="ctr" rotWithShape="0">
+                    <a:schemeClr val="bg2"/>
+                  </a:outerShdw>
+                </a:effectLst>
+              </a14:hiddenEffects>
+            </a:ext>
+          </a:extLst>
         </p:spPr>
       </p:pic>
     </p:spTree>
@@ -6233,23 +6373,53 @@
             <p:ph type="title"/>
           </p:nvPr>
         </p:nvSpPr>
+        <p:spPr/>
+        <p:txBody>
+          <a:bodyPr/>
+          <a:lstStyle/>
+          <a:p>
+            <a:r>
+              <a:rPr lang="pt-BR" altLang="pt-BR" dirty="0" smtClean="0">
+                <a:latin typeface="+mn-lt"/>
+              </a:rPr>
+              <a:t>FOTO DO PROJETO</a:t>
+            </a:r>
+            <a:endParaRPr lang="x-none" altLang="pt-BR" dirty="0">
+              <a:latin typeface="+mn-lt"/>
+            </a:endParaRPr>
+          </a:p>
+        </p:txBody>
+      </p:sp>
+      <p:pic>
+        <p:nvPicPr>
+          <p:cNvPr id="5" name="Imagem 4"/>
+          <p:cNvPicPr>
+            <a:picLocks noChangeAspect="1"/>
+          </p:cNvPicPr>
+          <p:nvPr/>
+        </p:nvPicPr>
+        <p:blipFill>
+          <a:blip r:embed="rId2">
+            <a:extLst>
+              <a:ext uri="{28A0092B-C50C-407E-A947-70E740481C1C}">
+                <a14:useLocalDpi xmlns:a14="http://schemas.microsoft.com/office/drawing/2010/main" val="0"/>
+              </a:ext>
+            </a:extLst>
+          </a:blip>
+          <a:stretch>
+            <a:fillRect/>
+          </a:stretch>
+        </p:blipFill>
         <p:spPr>
           <a:xfrm>
-            <a:off x="3660231" y="3104225"/>
-            <a:ext cx="4027831" cy="1320800"/>
+            <a:off x="2610392" y="1596976"/>
+            <a:ext cx="6958609" cy="5096637"/>
           </a:xfrm>
+          <a:prstGeom prst="rect">
+            <a:avLst/>
+          </a:prstGeom>
         </p:spPr>
-        <p:txBody>
-          <a:bodyPr/>
-          <a:lstStyle/>
-          <a:p>
-            <a:r>
-              <a:rPr lang="pt-BR" dirty="0"/>
-              <a:t>DEMONSTRAÇÃO...</a:t>
-            </a:r>
-          </a:p>
-        </p:txBody>
-      </p:sp>
+      </p:pic>
     </p:spTree>
   </p:cSld>
   <p:clrMapOvr>
@@ -6259,6 +6429,58 @@
 </file>
 
 <file path=ppt/slides/slide6.xml><?xml version="1.0" encoding="utf-8"?>
+<p:sld xmlns:a="http://schemas.openxmlformats.org/drawingml/2006/main" xmlns:r="http://schemas.openxmlformats.org/officeDocument/2006/relationships" xmlns:p="http://schemas.openxmlformats.org/presentationml/2006/main">
+  <p:cSld>
+    <p:spTree>
+      <p:nvGrpSpPr>
+        <p:cNvPr id="1" name=""/>
+        <p:cNvGrpSpPr/>
+        <p:nvPr/>
+      </p:nvGrpSpPr>
+      <p:grpSpPr>
+        <a:xfrm>
+          <a:off x="0" y="0"/>
+          <a:ext cx="0" cy="0"/>
+          <a:chOff x="0" y="0"/>
+          <a:chExt cx="0" cy="0"/>
+        </a:xfrm>
+      </p:grpSpPr>
+      <p:sp>
+        <p:nvSpPr>
+          <p:cNvPr id="2" name="Título 1"/>
+          <p:cNvSpPr>
+            <a:spLocks noGrp="1"/>
+          </p:cNvSpPr>
+          <p:nvPr>
+            <p:ph type="title"/>
+          </p:nvPr>
+        </p:nvSpPr>
+        <p:spPr>
+          <a:xfrm>
+            <a:off x="3660231" y="3104225"/>
+            <a:ext cx="4027831" cy="1320800"/>
+          </a:xfrm>
+        </p:spPr>
+        <p:txBody>
+          <a:bodyPr/>
+          <a:lstStyle/>
+          <a:p>
+            <a:r>
+              <a:rPr lang="pt-BR" dirty="0"/>
+              <a:t>DEMONSTRAÇÃO...</a:t>
+            </a:r>
+          </a:p>
+        </p:txBody>
+      </p:sp>
+    </p:spTree>
+  </p:cSld>
+  <p:clrMapOvr>
+    <a:masterClrMapping/>
+  </p:clrMapOvr>
+</p:sld>
+</file>
+
+<file path=ppt/slides/slide7.xml><?xml version="1.0" encoding="utf-8"?>
 <p:sld xmlns:a="http://schemas.openxmlformats.org/drawingml/2006/main" xmlns:r="http://schemas.openxmlformats.org/officeDocument/2006/relationships" xmlns:p="http://schemas.openxmlformats.org/presentationml/2006/main">
   <p:cSld>
     <p:spTree>
@@ -6563,7 +6785,7 @@
   <a:extraClrSchemeLst/>
   <a:extLst>
     <a:ext uri="{05A4C25C-085E-4340-85A3-A5531E510DB2}">
-      <thm15:themeFamily xmlns:thm15="http://schemas.microsoft.com/office/thememl/2012/main" name="Office Theme" id="{62F939B6-93AF-4DB8-9C6B-D6C7DFDC589F}" vid="{4A3C46E8-61CC-4603-A589-7422A47A8E4A}"/>
+      <thm15:themeFamily xmlns:thm15="http://schemas.microsoft.com/office/thememl/2012/main" xmlns="" name="Office Theme" id="{62F939B6-93AF-4DB8-9C6B-D6C7DFDC589F}" vid="{4A3C46E8-61CC-4603-A589-7422A47A8E4A}"/>
     </a:ext>
   </a:extLst>
 </a:theme>

</xml_diff>